<commit_message>
added maximum wait time to summary stats, updated ppt slides
</commit_message>
<xml_diff>
--- a/Monte Carlo Simulation for Stoplight.pptx
+++ b/Monte Carlo Simulation for Stoplight.pptx
@@ -13,6 +13,8 @@
     <p:sldId id="262" r:id="rId7"/>
     <p:sldId id="261" r:id="rId8"/>
     <p:sldId id="263" r:id="rId9"/>
+    <p:sldId id="264" r:id="rId10"/>
+    <p:sldId id="265" r:id="rId11"/>
   </p:sldIdLst>
   <p:sldSz cx="12192000" cy="6858000"/>
   <p:notesSz cx="6858000" cy="9144000"/>
@@ -111,6 +113,11 @@
       </a:defRPr>
     </a:lvl9pPr>
   </p:defaultTextStyle>
+  <p:extLst>
+    <p:ext uri="{EFAFB233-063F-42B5-8137-9DF3F51BA10A}">
+      <p15:sldGuideLst xmlns:p15="http://schemas.microsoft.com/office/powerpoint/2012/main"/>
+    </p:ext>
+  </p:extLst>
 </p:presentation>
 </file>
 
@@ -140,7 +147,7 @@
           <p:cNvPr id="2" name="Title 1">
             <a:extLst>
               <a:ext uri="{FF2B5EF4-FFF2-40B4-BE49-F238E27FC236}">
-                <a16:creationId xmlns:a16="http://schemas.microsoft.com/office/drawing/2014/main" id="{81A2DF12-2C64-44EF-9B2A-772976E0D10E}"/>
+                <a16:creationId xmlns:a16="http://schemas.microsoft.com/office/drawing/2014/main" xmlns="" id="{81A2DF12-2C64-44EF-9B2A-772976E0D10E}"/>
               </a:ext>
             </a:extLst>
           </p:cNvPr>
@@ -177,7 +184,7 @@
           <p:cNvPr id="3" name="Subtitle 2">
             <a:extLst>
               <a:ext uri="{FF2B5EF4-FFF2-40B4-BE49-F238E27FC236}">
-                <a16:creationId xmlns:a16="http://schemas.microsoft.com/office/drawing/2014/main" id="{4508BCC8-4781-4764-993D-E1F87B1A25DB}"/>
+                <a16:creationId xmlns:a16="http://schemas.microsoft.com/office/drawing/2014/main" xmlns="" id="{4508BCC8-4781-4764-993D-E1F87B1A25DB}"/>
               </a:ext>
             </a:extLst>
           </p:cNvPr>
@@ -247,7 +254,7 @@
           <p:cNvPr id="4" name="Date Placeholder 3">
             <a:extLst>
               <a:ext uri="{FF2B5EF4-FFF2-40B4-BE49-F238E27FC236}">
-                <a16:creationId xmlns:a16="http://schemas.microsoft.com/office/drawing/2014/main" id="{9686E95B-1444-4683-80E7-DCFA1B956E7D}"/>
+                <a16:creationId xmlns:a16="http://schemas.microsoft.com/office/drawing/2014/main" xmlns="" id="{9686E95B-1444-4683-80E7-DCFA1B956E7D}"/>
               </a:ext>
             </a:extLst>
           </p:cNvPr>
@@ -265,7 +272,7 @@
           <a:p>
             <a:fld id="{B7813718-B517-4FEC-B65D-43B8E562237A}" type="datetimeFigureOut">
               <a:rPr lang="en-US" smtClean="0"/>
-              <a:t>12/6/2017</a:t>
+              <a:t>12/6/17</a:t>
             </a:fld>
             <a:endParaRPr lang="en-US"/>
           </a:p>
@@ -276,7 +283,7 @@
           <p:cNvPr id="5" name="Footer Placeholder 4">
             <a:extLst>
               <a:ext uri="{FF2B5EF4-FFF2-40B4-BE49-F238E27FC236}">
-                <a16:creationId xmlns:a16="http://schemas.microsoft.com/office/drawing/2014/main" id="{9B438229-15AB-496D-8614-1495DB3C455B}"/>
+                <a16:creationId xmlns:a16="http://schemas.microsoft.com/office/drawing/2014/main" xmlns="" id="{9B438229-15AB-496D-8614-1495DB3C455B}"/>
               </a:ext>
             </a:extLst>
           </p:cNvPr>
@@ -301,7 +308,7 @@
           <p:cNvPr id="6" name="Slide Number Placeholder 5">
             <a:extLst>
               <a:ext uri="{FF2B5EF4-FFF2-40B4-BE49-F238E27FC236}">
-                <a16:creationId xmlns:a16="http://schemas.microsoft.com/office/drawing/2014/main" id="{C3B47E0A-EBB0-4007-B5C1-DE0F980E44E5}"/>
+                <a16:creationId xmlns:a16="http://schemas.microsoft.com/office/drawing/2014/main" xmlns="" id="{C3B47E0A-EBB0-4007-B5C1-DE0F980E44E5}"/>
               </a:ext>
             </a:extLst>
           </p:cNvPr>
@@ -360,7 +367,7 @@
           <p:cNvPr id="2" name="Title 1">
             <a:extLst>
               <a:ext uri="{FF2B5EF4-FFF2-40B4-BE49-F238E27FC236}">
-                <a16:creationId xmlns:a16="http://schemas.microsoft.com/office/drawing/2014/main" id="{427ECAEC-8363-4212-9938-F405FDDE9884}"/>
+                <a16:creationId xmlns:a16="http://schemas.microsoft.com/office/drawing/2014/main" xmlns="" id="{427ECAEC-8363-4212-9938-F405FDDE9884}"/>
               </a:ext>
             </a:extLst>
           </p:cNvPr>
@@ -388,7 +395,7 @@
           <p:cNvPr id="3" name="Vertical Text Placeholder 2">
             <a:extLst>
               <a:ext uri="{FF2B5EF4-FFF2-40B4-BE49-F238E27FC236}">
-                <a16:creationId xmlns:a16="http://schemas.microsoft.com/office/drawing/2014/main" id="{CD20D2C4-9F82-488A-8A17-8A6191FD7688}"/>
+                <a16:creationId xmlns:a16="http://schemas.microsoft.com/office/drawing/2014/main" xmlns="" id="{CD20D2C4-9F82-488A-8A17-8A6191FD7688}"/>
               </a:ext>
             </a:extLst>
           </p:cNvPr>
@@ -445,7 +452,7 @@
           <p:cNvPr id="4" name="Date Placeholder 3">
             <a:extLst>
               <a:ext uri="{FF2B5EF4-FFF2-40B4-BE49-F238E27FC236}">
-                <a16:creationId xmlns:a16="http://schemas.microsoft.com/office/drawing/2014/main" id="{3668B27A-63EB-457B-8A02-FFD9EB310F31}"/>
+                <a16:creationId xmlns:a16="http://schemas.microsoft.com/office/drawing/2014/main" xmlns="" id="{3668B27A-63EB-457B-8A02-FFD9EB310F31}"/>
               </a:ext>
             </a:extLst>
           </p:cNvPr>
@@ -463,7 +470,7 @@
           <a:p>
             <a:fld id="{B7813718-B517-4FEC-B65D-43B8E562237A}" type="datetimeFigureOut">
               <a:rPr lang="en-US" smtClean="0"/>
-              <a:t>12/6/2017</a:t>
+              <a:t>12/6/17</a:t>
             </a:fld>
             <a:endParaRPr lang="en-US"/>
           </a:p>
@@ -474,7 +481,7 @@
           <p:cNvPr id="5" name="Footer Placeholder 4">
             <a:extLst>
               <a:ext uri="{FF2B5EF4-FFF2-40B4-BE49-F238E27FC236}">
-                <a16:creationId xmlns:a16="http://schemas.microsoft.com/office/drawing/2014/main" id="{CD3B5333-C858-4F6E-B1F5-B7EB9E591CC9}"/>
+                <a16:creationId xmlns:a16="http://schemas.microsoft.com/office/drawing/2014/main" xmlns="" id="{CD3B5333-C858-4F6E-B1F5-B7EB9E591CC9}"/>
               </a:ext>
             </a:extLst>
           </p:cNvPr>
@@ -499,7 +506,7 @@
           <p:cNvPr id="6" name="Slide Number Placeholder 5">
             <a:extLst>
               <a:ext uri="{FF2B5EF4-FFF2-40B4-BE49-F238E27FC236}">
-                <a16:creationId xmlns:a16="http://schemas.microsoft.com/office/drawing/2014/main" id="{BC3C80B1-8C81-4AFD-8011-96333FF9D945}"/>
+                <a16:creationId xmlns:a16="http://schemas.microsoft.com/office/drawing/2014/main" xmlns="" id="{BC3C80B1-8C81-4AFD-8011-96333FF9D945}"/>
               </a:ext>
             </a:extLst>
           </p:cNvPr>
@@ -558,7 +565,7 @@
           <p:cNvPr id="2" name="Vertical Title 1">
             <a:extLst>
               <a:ext uri="{FF2B5EF4-FFF2-40B4-BE49-F238E27FC236}">
-                <a16:creationId xmlns:a16="http://schemas.microsoft.com/office/drawing/2014/main" id="{79AE4DD4-B55E-4FB0-B964-CF4633EB0931}"/>
+                <a16:creationId xmlns:a16="http://schemas.microsoft.com/office/drawing/2014/main" xmlns="" id="{79AE4DD4-B55E-4FB0-B964-CF4633EB0931}"/>
               </a:ext>
             </a:extLst>
           </p:cNvPr>
@@ -591,7 +598,7 @@
           <p:cNvPr id="3" name="Vertical Text Placeholder 2">
             <a:extLst>
               <a:ext uri="{FF2B5EF4-FFF2-40B4-BE49-F238E27FC236}">
-                <a16:creationId xmlns:a16="http://schemas.microsoft.com/office/drawing/2014/main" id="{C36DE33D-A858-44E8-85F6-C5B4102E9F60}"/>
+                <a16:creationId xmlns:a16="http://schemas.microsoft.com/office/drawing/2014/main" xmlns="" id="{C36DE33D-A858-44E8-85F6-C5B4102E9F60}"/>
               </a:ext>
             </a:extLst>
           </p:cNvPr>
@@ -653,7 +660,7 @@
           <p:cNvPr id="4" name="Date Placeholder 3">
             <a:extLst>
               <a:ext uri="{FF2B5EF4-FFF2-40B4-BE49-F238E27FC236}">
-                <a16:creationId xmlns:a16="http://schemas.microsoft.com/office/drawing/2014/main" id="{DFA81C6A-9547-4EE3-AC96-253DE41F0388}"/>
+                <a16:creationId xmlns:a16="http://schemas.microsoft.com/office/drawing/2014/main" xmlns="" id="{DFA81C6A-9547-4EE3-AC96-253DE41F0388}"/>
               </a:ext>
             </a:extLst>
           </p:cNvPr>
@@ -671,7 +678,7 @@
           <a:p>
             <a:fld id="{B7813718-B517-4FEC-B65D-43B8E562237A}" type="datetimeFigureOut">
               <a:rPr lang="en-US" smtClean="0"/>
-              <a:t>12/6/2017</a:t>
+              <a:t>12/6/17</a:t>
             </a:fld>
             <a:endParaRPr lang="en-US"/>
           </a:p>
@@ -682,7 +689,7 @@
           <p:cNvPr id="5" name="Footer Placeholder 4">
             <a:extLst>
               <a:ext uri="{FF2B5EF4-FFF2-40B4-BE49-F238E27FC236}">
-                <a16:creationId xmlns:a16="http://schemas.microsoft.com/office/drawing/2014/main" id="{31326EFD-C9DD-480D-B050-83B8C2FD50E8}"/>
+                <a16:creationId xmlns:a16="http://schemas.microsoft.com/office/drawing/2014/main" xmlns="" id="{31326EFD-C9DD-480D-B050-83B8C2FD50E8}"/>
               </a:ext>
             </a:extLst>
           </p:cNvPr>
@@ -707,7 +714,7 @@
           <p:cNvPr id="6" name="Slide Number Placeholder 5">
             <a:extLst>
               <a:ext uri="{FF2B5EF4-FFF2-40B4-BE49-F238E27FC236}">
-                <a16:creationId xmlns:a16="http://schemas.microsoft.com/office/drawing/2014/main" id="{4767ED27-14F6-4C68-B38F-E39432FE9BB0}"/>
+                <a16:creationId xmlns:a16="http://schemas.microsoft.com/office/drawing/2014/main" xmlns="" id="{4767ED27-14F6-4C68-B38F-E39432FE9BB0}"/>
               </a:ext>
             </a:extLst>
           </p:cNvPr>
@@ -766,7 +773,7 @@
           <p:cNvPr id="2" name="Title 1">
             <a:extLst>
               <a:ext uri="{FF2B5EF4-FFF2-40B4-BE49-F238E27FC236}">
-                <a16:creationId xmlns:a16="http://schemas.microsoft.com/office/drawing/2014/main" id="{10B22070-ADBA-44B8-AF20-8C3273B6804B}"/>
+                <a16:creationId xmlns:a16="http://schemas.microsoft.com/office/drawing/2014/main" xmlns="" id="{10B22070-ADBA-44B8-AF20-8C3273B6804B}"/>
               </a:ext>
             </a:extLst>
           </p:cNvPr>
@@ -794,7 +801,7 @@
           <p:cNvPr id="3" name="Content Placeholder 2">
             <a:extLst>
               <a:ext uri="{FF2B5EF4-FFF2-40B4-BE49-F238E27FC236}">
-                <a16:creationId xmlns:a16="http://schemas.microsoft.com/office/drawing/2014/main" id="{EA6E93D1-D77E-4AB7-8CA7-7174237AD1F7}"/>
+                <a16:creationId xmlns:a16="http://schemas.microsoft.com/office/drawing/2014/main" xmlns="" id="{EA6E93D1-D77E-4AB7-8CA7-7174237AD1F7}"/>
               </a:ext>
             </a:extLst>
           </p:cNvPr>
@@ -851,7 +858,7 @@
           <p:cNvPr id="4" name="Date Placeholder 3">
             <a:extLst>
               <a:ext uri="{FF2B5EF4-FFF2-40B4-BE49-F238E27FC236}">
-                <a16:creationId xmlns:a16="http://schemas.microsoft.com/office/drawing/2014/main" id="{DF74C62A-5B54-4087-9FDB-A0A87A5880CC}"/>
+                <a16:creationId xmlns:a16="http://schemas.microsoft.com/office/drawing/2014/main" xmlns="" id="{DF74C62A-5B54-4087-9FDB-A0A87A5880CC}"/>
               </a:ext>
             </a:extLst>
           </p:cNvPr>
@@ -869,7 +876,7 @@
           <a:p>
             <a:fld id="{B7813718-B517-4FEC-B65D-43B8E562237A}" type="datetimeFigureOut">
               <a:rPr lang="en-US" smtClean="0"/>
-              <a:t>12/6/2017</a:t>
+              <a:t>12/6/17</a:t>
             </a:fld>
             <a:endParaRPr lang="en-US"/>
           </a:p>
@@ -880,7 +887,7 @@
           <p:cNvPr id="5" name="Footer Placeholder 4">
             <a:extLst>
               <a:ext uri="{FF2B5EF4-FFF2-40B4-BE49-F238E27FC236}">
-                <a16:creationId xmlns:a16="http://schemas.microsoft.com/office/drawing/2014/main" id="{6AE2E25F-2E07-47E6-B87C-65EEB230C74C}"/>
+                <a16:creationId xmlns:a16="http://schemas.microsoft.com/office/drawing/2014/main" xmlns="" id="{6AE2E25F-2E07-47E6-B87C-65EEB230C74C}"/>
               </a:ext>
             </a:extLst>
           </p:cNvPr>
@@ -905,7 +912,7 @@
           <p:cNvPr id="6" name="Slide Number Placeholder 5">
             <a:extLst>
               <a:ext uri="{FF2B5EF4-FFF2-40B4-BE49-F238E27FC236}">
-                <a16:creationId xmlns:a16="http://schemas.microsoft.com/office/drawing/2014/main" id="{7FD69789-22FA-42B2-8D13-796E2249E30C}"/>
+                <a16:creationId xmlns:a16="http://schemas.microsoft.com/office/drawing/2014/main" xmlns="" id="{7FD69789-22FA-42B2-8D13-796E2249E30C}"/>
               </a:ext>
             </a:extLst>
           </p:cNvPr>
@@ -964,7 +971,7 @@
           <p:cNvPr id="2" name="Title 1">
             <a:extLst>
               <a:ext uri="{FF2B5EF4-FFF2-40B4-BE49-F238E27FC236}">
-                <a16:creationId xmlns:a16="http://schemas.microsoft.com/office/drawing/2014/main" id="{D8441D8C-D3F7-41E1-83F4-1F84E52021A4}"/>
+                <a16:creationId xmlns:a16="http://schemas.microsoft.com/office/drawing/2014/main" xmlns="" id="{D8441D8C-D3F7-41E1-83F4-1F84E52021A4}"/>
               </a:ext>
             </a:extLst>
           </p:cNvPr>
@@ -1001,7 +1008,7 @@
           <p:cNvPr id="3" name="Text Placeholder 2">
             <a:extLst>
               <a:ext uri="{FF2B5EF4-FFF2-40B4-BE49-F238E27FC236}">
-                <a16:creationId xmlns:a16="http://schemas.microsoft.com/office/drawing/2014/main" id="{736401C0-A79B-4DCC-9C52-60898FFCDCE4}"/>
+                <a16:creationId xmlns:a16="http://schemas.microsoft.com/office/drawing/2014/main" xmlns="" id="{736401C0-A79B-4DCC-9C52-60898FFCDCE4}"/>
               </a:ext>
             </a:extLst>
           </p:cNvPr>
@@ -1126,7 +1133,7 @@
           <p:cNvPr id="4" name="Date Placeholder 3">
             <a:extLst>
               <a:ext uri="{FF2B5EF4-FFF2-40B4-BE49-F238E27FC236}">
-                <a16:creationId xmlns:a16="http://schemas.microsoft.com/office/drawing/2014/main" id="{FFCC4F76-7C52-4620-AF0C-447B192C7BFB}"/>
+                <a16:creationId xmlns:a16="http://schemas.microsoft.com/office/drawing/2014/main" xmlns="" id="{FFCC4F76-7C52-4620-AF0C-447B192C7BFB}"/>
               </a:ext>
             </a:extLst>
           </p:cNvPr>
@@ -1144,7 +1151,7 @@
           <a:p>
             <a:fld id="{B7813718-B517-4FEC-B65D-43B8E562237A}" type="datetimeFigureOut">
               <a:rPr lang="en-US" smtClean="0"/>
-              <a:t>12/6/2017</a:t>
+              <a:t>12/6/17</a:t>
             </a:fld>
             <a:endParaRPr lang="en-US"/>
           </a:p>
@@ -1155,7 +1162,7 @@
           <p:cNvPr id="5" name="Footer Placeholder 4">
             <a:extLst>
               <a:ext uri="{FF2B5EF4-FFF2-40B4-BE49-F238E27FC236}">
-                <a16:creationId xmlns:a16="http://schemas.microsoft.com/office/drawing/2014/main" id="{F30F638D-3A9C-4343-B9B8-F57EBFD98CC8}"/>
+                <a16:creationId xmlns:a16="http://schemas.microsoft.com/office/drawing/2014/main" xmlns="" id="{F30F638D-3A9C-4343-B9B8-F57EBFD98CC8}"/>
               </a:ext>
             </a:extLst>
           </p:cNvPr>
@@ -1180,7 +1187,7 @@
           <p:cNvPr id="6" name="Slide Number Placeholder 5">
             <a:extLst>
               <a:ext uri="{FF2B5EF4-FFF2-40B4-BE49-F238E27FC236}">
-                <a16:creationId xmlns:a16="http://schemas.microsoft.com/office/drawing/2014/main" id="{A94EB0EE-3C8E-40F0-80F5-1BD453923A57}"/>
+                <a16:creationId xmlns:a16="http://schemas.microsoft.com/office/drawing/2014/main" xmlns="" id="{A94EB0EE-3C8E-40F0-80F5-1BD453923A57}"/>
               </a:ext>
             </a:extLst>
           </p:cNvPr>
@@ -1239,7 +1246,7 @@
           <p:cNvPr id="2" name="Title 1">
             <a:extLst>
               <a:ext uri="{FF2B5EF4-FFF2-40B4-BE49-F238E27FC236}">
-                <a16:creationId xmlns:a16="http://schemas.microsoft.com/office/drawing/2014/main" id="{9883AAB7-CD2E-438C-906E-50C3FC755514}"/>
+                <a16:creationId xmlns:a16="http://schemas.microsoft.com/office/drawing/2014/main" xmlns="" id="{9883AAB7-CD2E-438C-906E-50C3FC755514}"/>
               </a:ext>
             </a:extLst>
           </p:cNvPr>
@@ -1267,7 +1274,7 @@
           <p:cNvPr id="3" name="Content Placeholder 2">
             <a:extLst>
               <a:ext uri="{FF2B5EF4-FFF2-40B4-BE49-F238E27FC236}">
-                <a16:creationId xmlns:a16="http://schemas.microsoft.com/office/drawing/2014/main" id="{E3A3314C-DDE7-4FCF-91F4-AFAF24D0D2C0}"/>
+                <a16:creationId xmlns:a16="http://schemas.microsoft.com/office/drawing/2014/main" xmlns="" id="{E3A3314C-DDE7-4FCF-91F4-AFAF24D0D2C0}"/>
               </a:ext>
             </a:extLst>
           </p:cNvPr>
@@ -1329,7 +1336,7 @@
           <p:cNvPr id="4" name="Content Placeholder 3">
             <a:extLst>
               <a:ext uri="{FF2B5EF4-FFF2-40B4-BE49-F238E27FC236}">
-                <a16:creationId xmlns:a16="http://schemas.microsoft.com/office/drawing/2014/main" id="{744DD938-14CD-4CAD-ACB2-CAFFCBEBC884}"/>
+                <a16:creationId xmlns:a16="http://schemas.microsoft.com/office/drawing/2014/main" xmlns="" id="{744DD938-14CD-4CAD-ACB2-CAFFCBEBC884}"/>
               </a:ext>
             </a:extLst>
           </p:cNvPr>
@@ -1391,7 +1398,7 @@
           <p:cNvPr id="5" name="Date Placeholder 4">
             <a:extLst>
               <a:ext uri="{FF2B5EF4-FFF2-40B4-BE49-F238E27FC236}">
-                <a16:creationId xmlns:a16="http://schemas.microsoft.com/office/drawing/2014/main" id="{6DDEC7C4-BCFE-400E-952A-445DD814C72B}"/>
+                <a16:creationId xmlns:a16="http://schemas.microsoft.com/office/drawing/2014/main" xmlns="" id="{6DDEC7C4-BCFE-400E-952A-445DD814C72B}"/>
               </a:ext>
             </a:extLst>
           </p:cNvPr>
@@ -1409,7 +1416,7 @@
           <a:p>
             <a:fld id="{B7813718-B517-4FEC-B65D-43B8E562237A}" type="datetimeFigureOut">
               <a:rPr lang="en-US" smtClean="0"/>
-              <a:t>12/6/2017</a:t>
+              <a:t>12/6/17</a:t>
             </a:fld>
             <a:endParaRPr lang="en-US"/>
           </a:p>
@@ -1420,7 +1427,7 @@
           <p:cNvPr id="6" name="Footer Placeholder 5">
             <a:extLst>
               <a:ext uri="{FF2B5EF4-FFF2-40B4-BE49-F238E27FC236}">
-                <a16:creationId xmlns:a16="http://schemas.microsoft.com/office/drawing/2014/main" id="{1457A23A-6BD4-4AC3-B30A-256023B6EFC1}"/>
+                <a16:creationId xmlns:a16="http://schemas.microsoft.com/office/drawing/2014/main" xmlns="" id="{1457A23A-6BD4-4AC3-B30A-256023B6EFC1}"/>
               </a:ext>
             </a:extLst>
           </p:cNvPr>
@@ -1445,7 +1452,7 @@
           <p:cNvPr id="7" name="Slide Number Placeholder 6">
             <a:extLst>
               <a:ext uri="{FF2B5EF4-FFF2-40B4-BE49-F238E27FC236}">
-                <a16:creationId xmlns:a16="http://schemas.microsoft.com/office/drawing/2014/main" id="{70DA508A-4C68-4796-BCA8-96C01792F1FF}"/>
+                <a16:creationId xmlns:a16="http://schemas.microsoft.com/office/drawing/2014/main" xmlns="" id="{70DA508A-4C68-4796-BCA8-96C01792F1FF}"/>
               </a:ext>
             </a:extLst>
           </p:cNvPr>
@@ -1504,7 +1511,7 @@
           <p:cNvPr id="2" name="Title 1">
             <a:extLst>
               <a:ext uri="{FF2B5EF4-FFF2-40B4-BE49-F238E27FC236}">
-                <a16:creationId xmlns:a16="http://schemas.microsoft.com/office/drawing/2014/main" id="{D5A432B5-2079-44F9-B114-39D557206A15}"/>
+                <a16:creationId xmlns:a16="http://schemas.microsoft.com/office/drawing/2014/main" xmlns="" id="{D5A432B5-2079-44F9-B114-39D557206A15}"/>
               </a:ext>
             </a:extLst>
           </p:cNvPr>
@@ -1537,7 +1544,7 @@
           <p:cNvPr id="3" name="Text Placeholder 2">
             <a:extLst>
               <a:ext uri="{FF2B5EF4-FFF2-40B4-BE49-F238E27FC236}">
-                <a16:creationId xmlns:a16="http://schemas.microsoft.com/office/drawing/2014/main" id="{89915A9A-9842-4925-8A4D-4C16B6268497}"/>
+                <a16:creationId xmlns:a16="http://schemas.microsoft.com/office/drawing/2014/main" xmlns="" id="{89915A9A-9842-4925-8A4D-4C16B6268497}"/>
               </a:ext>
             </a:extLst>
           </p:cNvPr>
@@ -1608,7 +1615,7 @@
           <p:cNvPr id="4" name="Content Placeholder 3">
             <a:extLst>
               <a:ext uri="{FF2B5EF4-FFF2-40B4-BE49-F238E27FC236}">
-                <a16:creationId xmlns:a16="http://schemas.microsoft.com/office/drawing/2014/main" id="{F6D9BBDD-CBCF-4761-9EC3-48947517255A}"/>
+                <a16:creationId xmlns:a16="http://schemas.microsoft.com/office/drawing/2014/main" xmlns="" id="{F6D9BBDD-CBCF-4761-9EC3-48947517255A}"/>
               </a:ext>
             </a:extLst>
           </p:cNvPr>
@@ -1670,7 +1677,7 @@
           <p:cNvPr id="5" name="Text Placeholder 4">
             <a:extLst>
               <a:ext uri="{FF2B5EF4-FFF2-40B4-BE49-F238E27FC236}">
-                <a16:creationId xmlns:a16="http://schemas.microsoft.com/office/drawing/2014/main" id="{EFBE0C41-58FA-4181-A3A4-22E8E23DFE50}"/>
+                <a16:creationId xmlns:a16="http://schemas.microsoft.com/office/drawing/2014/main" xmlns="" id="{EFBE0C41-58FA-4181-A3A4-22E8E23DFE50}"/>
               </a:ext>
             </a:extLst>
           </p:cNvPr>
@@ -1741,7 +1748,7 @@
           <p:cNvPr id="6" name="Content Placeholder 5">
             <a:extLst>
               <a:ext uri="{FF2B5EF4-FFF2-40B4-BE49-F238E27FC236}">
-                <a16:creationId xmlns:a16="http://schemas.microsoft.com/office/drawing/2014/main" id="{15805466-A209-480E-9A72-9D7DE2E41DDC}"/>
+                <a16:creationId xmlns:a16="http://schemas.microsoft.com/office/drawing/2014/main" xmlns="" id="{15805466-A209-480E-9A72-9D7DE2E41DDC}"/>
               </a:ext>
             </a:extLst>
           </p:cNvPr>
@@ -1803,7 +1810,7 @@
           <p:cNvPr id="7" name="Date Placeholder 6">
             <a:extLst>
               <a:ext uri="{FF2B5EF4-FFF2-40B4-BE49-F238E27FC236}">
-                <a16:creationId xmlns:a16="http://schemas.microsoft.com/office/drawing/2014/main" id="{C5C57EEF-6376-440E-B054-4853EAA195FB}"/>
+                <a16:creationId xmlns:a16="http://schemas.microsoft.com/office/drawing/2014/main" xmlns="" id="{C5C57EEF-6376-440E-B054-4853EAA195FB}"/>
               </a:ext>
             </a:extLst>
           </p:cNvPr>
@@ -1821,7 +1828,7 @@
           <a:p>
             <a:fld id="{B7813718-B517-4FEC-B65D-43B8E562237A}" type="datetimeFigureOut">
               <a:rPr lang="en-US" smtClean="0"/>
-              <a:t>12/6/2017</a:t>
+              <a:t>12/6/17</a:t>
             </a:fld>
             <a:endParaRPr lang="en-US"/>
           </a:p>
@@ -1832,7 +1839,7 @@
           <p:cNvPr id="8" name="Footer Placeholder 7">
             <a:extLst>
               <a:ext uri="{FF2B5EF4-FFF2-40B4-BE49-F238E27FC236}">
-                <a16:creationId xmlns:a16="http://schemas.microsoft.com/office/drawing/2014/main" id="{45A66270-9207-4376-97A4-8883C6BB8A24}"/>
+                <a16:creationId xmlns:a16="http://schemas.microsoft.com/office/drawing/2014/main" xmlns="" id="{45A66270-9207-4376-97A4-8883C6BB8A24}"/>
               </a:ext>
             </a:extLst>
           </p:cNvPr>
@@ -1857,7 +1864,7 @@
           <p:cNvPr id="9" name="Slide Number Placeholder 8">
             <a:extLst>
               <a:ext uri="{FF2B5EF4-FFF2-40B4-BE49-F238E27FC236}">
-                <a16:creationId xmlns:a16="http://schemas.microsoft.com/office/drawing/2014/main" id="{D1F69880-26D2-470A-A6C5-DB6210F719C9}"/>
+                <a16:creationId xmlns:a16="http://schemas.microsoft.com/office/drawing/2014/main" xmlns="" id="{D1F69880-26D2-470A-A6C5-DB6210F719C9}"/>
               </a:ext>
             </a:extLst>
           </p:cNvPr>
@@ -1916,7 +1923,7 @@
           <p:cNvPr id="2" name="Title 1">
             <a:extLst>
               <a:ext uri="{FF2B5EF4-FFF2-40B4-BE49-F238E27FC236}">
-                <a16:creationId xmlns:a16="http://schemas.microsoft.com/office/drawing/2014/main" id="{6A8448E7-893E-416F-968C-0DEF946CF9AC}"/>
+                <a16:creationId xmlns:a16="http://schemas.microsoft.com/office/drawing/2014/main" xmlns="" id="{6A8448E7-893E-416F-968C-0DEF946CF9AC}"/>
               </a:ext>
             </a:extLst>
           </p:cNvPr>
@@ -1944,7 +1951,7 @@
           <p:cNvPr id="3" name="Date Placeholder 2">
             <a:extLst>
               <a:ext uri="{FF2B5EF4-FFF2-40B4-BE49-F238E27FC236}">
-                <a16:creationId xmlns:a16="http://schemas.microsoft.com/office/drawing/2014/main" id="{AFB6CE66-A63A-48C8-9785-E35530D1EDFF}"/>
+                <a16:creationId xmlns:a16="http://schemas.microsoft.com/office/drawing/2014/main" xmlns="" id="{AFB6CE66-A63A-48C8-9785-E35530D1EDFF}"/>
               </a:ext>
             </a:extLst>
           </p:cNvPr>
@@ -1962,7 +1969,7 @@
           <a:p>
             <a:fld id="{B7813718-B517-4FEC-B65D-43B8E562237A}" type="datetimeFigureOut">
               <a:rPr lang="en-US" smtClean="0"/>
-              <a:t>12/6/2017</a:t>
+              <a:t>12/6/17</a:t>
             </a:fld>
             <a:endParaRPr lang="en-US"/>
           </a:p>
@@ -1973,7 +1980,7 @@
           <p:cNvPr id="4" name="Footer Placeholder 3">
             <a:extLst>
               <a:ext uri="{FF2B5EF4-FFF2-40B4-BE49-F238E27FC236}">
-                <a16:creationId xmlns:a16="http://schemas.microsoft.com/office/drawing/2014/main" id="{51DB2E5B-9057-4DE6-9BC6-528B6BFF29B6}"/>
+                <a16:creationId xmlns:a16="http://schemas.microsoft.com/office/drawing/2014/main" xmlns="" id="{51DB2E5B-9057-4DE6-9BC6-528B6BFF29B6}"/>
               </a:ext>
             </a:extLst>
           </p:cNvPr>
@@ -1998,7 +2005,7 @@
           <p:cNvPr id="5" name="Slide Number Placeholder 4">
             <a:extLst>
               <a:ext uri="{FF2B5EF4-FFF2-40B4-BE49-F238E27FC236}">
-                <a16:creationId xmlns:a16="http://schemas.microsoft.com/office/drawing/2014/main" id="{2C308C32-915B-465B-83DC-70AFF6507EF7}"/>
+                <a16:creationId xmlns:a16="http://schemas.microsoft.com/office/drawing/2014/main" xmlns="" id="{2C308C32-915B-465B-83DC-70AFF6507EF7}"/>
               </a:ext>
             </a:extLst>
           </p:cNvPr>
@@ -2057,7 +2064,7 @@
           <p:cNvPr id="2" name="Date Placeholder 1">
             <a:extLst>
               <a:ext uri="{FF2B5EF4-FFF2-40B4-BE49-F238E27FC236}">
-                <a16:creationId xmlns:a16="http://schemas.microsoft.com/office/drawing/2014/main" id="{98377080-A7B1-401F-963E-EF6306364ECE}"/>
+                <a16:creationId xmlns:a16="http://schemas.microsoft.com/office/drawing/2014/main" xmlns="" id="{98377080-A7B1-401F-963E-EF6306364ECE}"/>
               </a:ext>
             </a:extLst>
           </p:cNvPr>
@@ -2075,7 +2082,7 @@
           <a:p>
             <a:fld id="{B7813718-B517-4FEC-B65D-43B8E562237A}" type="datetimeFigureOut">
               <a:rPr lang="en-US" smtClean="0"/>
-              <a:t>12/6/2017</a:t>
+              <a:t>12/6/17</a:t>
             </a:fld>
             <a:endParaRPr lang="en-US"/>
           </a:p>
@@ -2086,7 +2093,7 @@
           <p:cNvPr id="3" name="Footer Placeholder 2">
             <a:extLst>
               <a:ext uri="{FF2B5EF4-FFF2-40B4-BE49-F238E27FC236}">
-                <a16:creationId xmlns:a16="http://schemas.microsoft.com/office/drawing/2014/main" id="{00F0C09C-B434-4D3F-AFAC-2232D1E01956}"/>
+                <a16:creationId xmlns:a16="http://schemas.microsoft.com/office/drawing/2014/main" xmlns="" id="{00F0C09C-B434-4D3F-AFAC-2232D1E01956}"/>
               </a:ext>
             </a:extLst>
           </p:cNvPr>
@@ -2111,7 +2118,7 @@
           <p:cNvPr id="4" name="Slide Number Placeholder 3">
             <a:extLst>
               <a:ext uri="{FF2B5EF4-FFF2-40B4-BE49-F238E27FC236}">
-                <a16:creationId xmlns:a16="http://schemas.microsoft.com/office/drawing/2014/main" id="{199942BC-D3C9-49A3-AEB3-2B8DDD8A0F04}"/>
+                <a16:creationId xmlns:a16="http://schemas.microsoft.com/office/drawing/2014/main" xmlns="" id="{199942BC-D3C9-49A3-AEB3-2B8DDD8A0F04}"/>
               </a:ext>
             </a:extLst>
           </p:cNvPr>
@@ -2170,7 +2177,7 @@
           <p:cNvPr id="2" name="Title 1">
             <a:extLst>
               <a:ext uri="{FF2B5EF4-FFF2-40B4-BE49-F238E27FC236}">
-                <a16:creationId xmlns:a16="http://schemas.microsoft.com/office/drawing/2014/main" id="{67824887-D646-4935-BB77-71F4CFE58EC3}"/>
+                <a16:creationId xmlns:a16="http://schemas.microsoft.com/office/drawing/2014/main" xmlns="" id="{67824887-D646-4935-BB77-71F4CFE58EC3}"/>
               </a:ext>
             </a:extLst>
           </p:cNvPr>
@@ -2207,7 +2214,7 @@
           <p:cNvPr id="3" name="Content Placeholder 2">
             <a:extLst>
               <a:ext uri="{FF2B5EF4-FFF2-40B4-BE49-F238E27FC236}">
-                <a16:creationId xmlns:a16="http://schemas.microsoft.com/office/drawing/2014/main" id="{6C6D2C20-1029-420F-ABFE-FF0BBDC34CDF}"/>
+                <a16:creationId xmlns:a16="http://schemas.microsoft.com/office/drawing/2014/main" xmlns="" id="{6C6D2C20-1029-420F-ABFE-FF0BBDC34CDF}"/>
               </a:ext>
             </a:extLst>
           </p:cNvPr>
@@ -2297,7 +2304,7 @@
           <p:cNvPr id="4" name="Text Placeholder 3">
             <a:extLst>
               <a:ext uri="{FF2B5EF4-FFF2-40B4-BE49-F238E27FC236}">
-                <a16:creationId xmlns:a16="http://schemas.microsoft.com/office/drawing/2014/main" id="{F7FE1BF0-034A-425A-9F50-F66CFD89ECED}"/>
+                <a16:creationId xmlns:a16="http://schemas.microsoft.com/office/drawing/2014/main" xmlns="" id="{F7FE1BF0-034A-425A-9F50-F66CFD89ECED}"/>
               </a:ext>
             </a:extLst>
           </p:cNvPr>
@@ -2368,7 +2375,7 @@
           <p:cNvPr id="5" name="Date Placeholder 4">
             <a:extLst>
               <a:ext uri="{FF2B5EF4-FFF2-40B4-BE49-F238E27FC236}">
-                <a16:creationId xmlns:a16="http://schemas.microsoft.com/office/drawing/2014/main" id="{3D0A16FD-7E6D-4E7E-857D-78F777577721}"/>
+                <a16:creationId xmlns:a16="http://schemas.microsoft.com/office/drawing/2014/main" xmlns="" id="{3D0A16FD-7E6D-4E7E-857D-78F777577721}"/>
               </a:ext>
             </a:extLst>
           </p:cNvPr>
@@ -2386,7 +2393,7 @@
           <a:p>
             <a:fld id="{B7813718-B517-4FEC-B65D-43B8E562237A}" type="datetimeFigureOut">
               <a:rPr lang="en-US" smtClean="0"/>
-              <a:t>12/6/2017</a:t>
+              <a:t>12/6/17</a:t>
             </a:fld>
             <a:endParaRPr lang="en-US"/>
           </a:p>
@@ -2397,7 +2404,7 @@
           <p:cNvPr id="6" name="Footer Placeholder 5">
             <a:extLst>
               <a:ext uri="{FF2B5EF4-FFF2-40B4-BE49-F238E27FC236}">
-                <a16:creationId xmlns:a16="http://schemas.microsoft.com/office/drawing/2014/main" id="{7D834680-E531-4781-8ADF-3A419CFDADAC}"/>
+                <a16:creationId xmlns:a16="http://schemas.microsoft.com/office/drawing/2014/main" xmlns="" id="{7D834680-E531-4781-8ADF-3A419CFDADAC}"/>
               </a:ext>
             </a:extLst>
           </p:cNvPr>
@@ -2422,7 +2429,7 @@
           <p:cNvPr id="7" name="Slide Number Placeholder 6">
             <a:extLst>
               <a:ext uri="{FF2B5EF4-FFF2-40B4-BE49-F238E27FC236}">
-                <a16:creationId xmlns:a16="http://schemas.microsoft.com/office/drawing/2014/main" id="{F22650A8-F1C1-4B91-87A1-EA75387EA5B3}"/>
+                <a16:creationId xmlns:a16="http://schemas.microsoft.com/office/drawing/2014/main" xmlns="" id="{F22650A8-F1C1-4B91-87A1-EA75387EA5B3}"/>
               </a:ext>
             </a:extLst>
           </p:cNvPr>
@@ -2481,7 +2488,7 @@
           <p:cNvPr id="2" name="Title 1">
             <a:extLst>
               <a:ext uri="{FF2B5EF4-FFF2-40B4-BE49-F238E27FC236}">
-                <a16:creationId xmlns:a16="http://schemas.microsoft.com/office/drawing/2014/main" id="{8D0CF7C2-C781-4CB0-8124-BB62EE89AA84}"/>
+                <a16:creationId xmlns:a16="http://schemas.microsoft.com/office/drawing/2014/main" xmlns="" id="{8D0CF7C2-C781-4CB0-8124-BB62EE89AA84}"/>
               </a:ext>
             </a:extLst>
           </p:cNvPr>
@@ -2518,7 +2525,7 @@
           <p:cNvPr id="3" name="Picture Placeholder 2">
             <a:extLst>
               <a:ext uri="{FF2B5EF4-FFF2-40B4-BE49-F238E27FC236}">
-                <a16:creationId xmlns:a16="http://schemas.microsoft.com/office/drawing/2014/main" id="{5E7624FD-C0C0-4A8F-A9BA-F0FF58BD99EE}"/>
+                <a16:creationId xmlns:a16="http://schemas.microsoft.com/office/drawing/2014/main" xmlns="" id="{5E7624FD-C0C0-4A8F-A9BA-F0FF58BD99EE}"/>
               </a:ext>
             </a:extLst>
           </p:cNvPr>
@@ -2585,7 +2592,7 @@
           <p:cNvPr id="4" name="Text Placeholder 3">
             <a:extLst>
               <a:ext uri="{FF2B5EF4-FFF2-40B4-BE49-F238E27FC236}">
-                <a16:creationId xmlns:a16="http://schemas.microsoft.com/office/drawing/2014/main" id="{3FDD39B4-3D9E-4DBA-A1CF-41BAA138A3CB}"/>
+                <a16:creationId xmlns:a16="http://schemas.microsoft.com/office/drawing/2014/main" xmlns="" id="{3FDD39B4-3D9E-4DBA-A1CF-41BAA138A3CB}"/>
               </a:ext>
             </a:extLst>
           </p:cNvPr>
@@ -2656,7 +2663,7 @@
           <p:cNvPr id="5" name="Date Placeholder 4">
             <a:extLst>
               <a:ext uri="{FF2B5EF4-FFF2-40B4-BE49-F238E27FC236}">
-                <a16:creationId xmlns:a16="http://schemas.microsoft.com/office/drawing/2014/main" id="{AF45A1BE-1FE0-4895-96ED-86D251789B5B}"/>
+                <a16:creationId xmlns:a16="http://schemas.microsoft.com/office/drawing/2014/main" xmlns="" id="{AF45A1BE-1FE0-4895-96ED-86D251789B5B}"/>
               </a:ext>
             </a:extLst>
           </p:cNvPr>
@@ -2674,7 +2681,7 @@
           <a:p>
             <a:fld id="{B7813718-B517-4FEC-B65D-43B8E562237A}" type="datetimeFigureOut">
               <a:rPr lang="en-US" smtClean="0"/>
-              <a:t>12/6/2017</a:t>
+              <a:t>12/6/17</a:t>
             </a:fld>
             <a:endParaRPr lang="en-US"/>
           </a:p>
@@ -2685,7 +2692,7 @@
           <p:cNvPr id="6" name="Footer Placeholder 5">
             <a:extLst>
               <a:ext uri="{FF2B5EF4-FFF2-40B4-BE49-F238E27FC236}">
-                <a16:creationId xmlns:a16="http://schemas.microsoft.com/office/drawing/2014/main" id="{05F2F03B-BC91-4DAB-BAE5-27978BBDBB7B}"/>
+                <a16:creationId xmlns:a16="http://schemas.microsoft.com/office/drawing/2014/main" xmlns="" id="{05F2F03B-BC91-4DAB-BAE5-27978BBDBB7B}"/>
               </a:ext>
             </a:extLst>
           </p:cNvPr>
@@ -2710,7 +2717,7 @@
           <p:cNvPr id="7" name="Slide Number Placeholder 6">
             <a:extLst>
               <a:ext uri="{FF2B5EF4-FFF2-40B4-BE49-F238E27FC236}">
-                <a16:creationId xmlns:a16="http://schemas.microsoft.com/office/drawing/2014/main" id="{1C078FD1-274D-42C0-8440-0C4179285A36}"/>
+                <a16:creationId xmlns:a16="http://schemas.microsoft.com/office/drawing/2014/main" xmlns="" id="{1C078FD1-274D-42C0-8440-0C4179285A36}"/>
               </a:ext>
             </a:extLst>
           </p:cNvPr>
@@ -2804,7 +2811,7 @@
           <p:cNvPr id="2" name="Title Placeholder 1">
             <a:extLst>
               <a:ext uri="{FF2B5EF4-FFF2-40B4-BE49-F238E27FC236}">
-                <a16:creationId xmlns:a16="http://schemas.microsoft.com/office/drawing/2014/main" id="{7176B617-2BAC-4EA8-99EA-5E97A803C1FA}"/>
+                <a16:creationId xmlns:a16="http://schemas.microsoft.com/office/drawing/2014/main" xmlns="" id="{7176B617-2BAC-4EA8-99EA-5E97A803C1FA}"/>
               </a:ext>
             </a:extLst>
           </p:cNvPr>
@@ -2842,7 +2849,7 @@
           <p:cNvPr id="3" name="Text Placeholder 2">
             <a:extLst>
               <a:ext uri="{FF2B5EF4-FFF2-40B4-BE49-F238E27FC236}">
-                <a16:creationId xmlns:a16="http://schemas.microsoft.com/office/drawing/2014/main" id="{FAC696C7-BD48-4C55-900D-79A773610BEE}"/>
+                <a16:creationId xmlns:a16="http://schemas.microsoft.com/office/drawing/2014/main" xmlns="" id="{FAC696C7-BD48-4C55-900D-79A773610BEE}"/>
               </a:ext>
             </a:extLst>
           </p:cNvPr>
@@ -2909,7 +2916,7 @@
           <p:cNvPr id="4" name="Date Placeholder 3">
             <a:extLst>
               <a:ext uri="{FF2B5EF4-FFF2-40B4-BE49-F238E27FC236}">
-                <a16:creationId xmlns:a16="http://schemas.microsoft.com/office/drawing/2014/main" id="{D980E750-BFBD-4B82-87EB-7951C867498A}"/>
+                <a16:creationId xmlns:a16="http://schemas.microsoft.com/office/drawing/2014/main" xmlns="" id="{D980E750-BFBD-4B82-87EB-7951C867498A}"/>
               </a:ext>
             </a:extLst>
           </p:cNvPr>
@@ -2945,7 +2952,7 @@
           <a:p>
             <a:fld id="{B7813718-B517-4FEC-B65D-43B8E562237A}" type="datetimeFigureOut">
               <a:rPr lang="en-US" smtClean="0"/>
-              <a:t>12/6/2017</a:t>
+              <a:t>12/6/17</a:t>
             </a:fld>
             <a:endParaRPr lang="en-US"/>
           </a:p>
@@ -2956,7 +2963,7 @@
           <p:cNvPr id="5" name="Footer Placeholder 4">
             <a:extLst>
               <a:ext uri="{FF2B5EF4-FFF2-40B4-BE49-F238E27FC236}">
-                <a16:creationId xmlns:a16="http://schemas.microsoft.com/office/drawing/2014/main" id="{10101A9A-1FAC-48C6-80DD-FD450736FAE8}"/>
+                <a16:creationId xmlns:a16="http://schemas.microsoft.com/office/drawing/2014/main" xmlns="" id="{10101A9A-1FAC-48C6-80DD-FD450736FAE8}"/>
               </a:ext>
             </a:extLst>
           </p:cNvPr>
@@ -2999,7 +3006,7 @@
           <p:cNvPr id="6" name="Slide Number Placeholder 5">
             <a:extLst>
               <a:ext uri="{FF2B5EF4-FFF2-40B4-BE49-F238E27FC236}">
-                <a16:creationId xmlns:a16="http://schemas.microsoft.com/office/drawing/2014/main" id="{11AE0A42-4F0F-4687-A60E-3E0E84994FDE}"/>
+                <a16:creationId xmlns:a16="http://schemas.microsoft.com/office/drawing/2014/main" xmlns="" id="{11AE0A42-4F0F-4687-A60E-3E0E84994FDE}"/>
               </a:ext>
             </a:extLst>
           </p:cNvPr>
@@ -3403,7 +3410,7 @@
           <p:cNvPr id="2" name="Title 1">
             <a:extLst>
               <a:ext uri="{FF2B5EF4-FFF2-40B4-BE49-F238E27FC236}">
-                <a16:creationId xmlns:a16="http://schemas.microsoft.com/office/drawing/2014/main" id="{E516A298-EAB9-429E-A2E2-61C6711CD930}"/>
+                <a16:creationId xmlns:a16="http://schemas.microsoft.com/office/drawing/2014/main" xmlns="" id="{E516A298-EAB9-429E-A2E2-61C6711CD930}"/>
               </a:ext>
             </a:extLst>
           </p:cNvPr>
@@ -3431,7 +3438,7 @@
           <p:cNvPr id="3" name="Subtitle 2">
             <a:extLst>
               <a:ext uri="{FF2B5EF4-FFF2-40B4-BE49-F238E27FC236}">
-                <a16:creationId xmlns:a16="http://schemas.microsoft.com/office/drawing/2014/main" id="{D4C67503-8F47-46E8-8FC8-AE85E566E0AF}"/>
+                <a16:creationId xmlns:a16="http://schemas.microsoft.com/office/drawing/2014/main" xmlns="" id="{D4C67503-8F47-46E8-8FC8-AE85E566E0AF}"/>
               </a:ext>
             </a:extLst>
           </p:cNvPr>
@@ -3483,6 +3490,66 @@
     <p:extLst>
       <p:ext uri="{BB962C8B-B14F-4D97-AF65-F5344CB8AC3E}">
         <p14:creationId xmlns:p14="http://schemas.microsoft.com/office/powerpoint/2010/main" val="530536365"/>
+      </p:ext>
+    </p:extLst>
+  </p:cSld>
+  <p:clrMapOvr>
+    <a:masterClrMapping/>
+  </p:clrMapOvr>
+</p:sld>
+</file>
+
+<file path=ppt/slides/slide10.xml><?xml version="1.0" encoding="utf-8"?>
+<p:sld xmlns:a="http://schemas.openxmlformats.org/drawingml/2006/main" xmlns:r="http://schemas.openxmlformats.org/officeDocument/2006/relationships" xmlns:p="http://schemas.openxmlformats.org/presentationml/2006/main">
+  <p:cSld>
+    <p:spTree>
+      <p:nvGrpSpPr>
+        <p:cNvPr id="1" name=""/>
+        <p:cNvGrpSpPr/>
+        <p:nvPr/>
+      </p:nvGrpSpPr>
+      <p:grpSpPr>
+        <a:xfrm>
+          <a:off x="0" y="0"/>
+          <a:ext cx="0" cy="0"/>
+          <a:chOff x="0" y="0"/>
+          <a:chExt cx="0" cy="0"/>
+        </a:xfrm>
+      </p:grpSpPr>
+      <p:pic>
+        <p:nvPicPr>
+          <p:cNvPr id="2" name="Picture 1"/>
+          <p:cNvPicPr>
+            <a:picLocks noChangeAspect="1"/>
+          </p:cNvPicPr>
+          <p:nvPr/>
+        </p:nvPicPr>
+        <p:blipFill>
+          <a:blip r:embed="rId2">
+            <a:extLst>
+              <a:ext uri="{28A0092B-C50C-407E-A947-70E740481C1C}">
+                <a14:useLocalDpi xmlns:a14="http://schemas.microsoft.com/office/drawing/2010/main" val="0"/>
+              </a:ext>
+            </a:extLst>
+          </a:blip>
+          <a:stretch>
+            <a:fillRect/>
+          </a:stretch>
+        </p:blipFill>
+        <p:spPr>
+          <a:xfrm>
+            <a:off x="1600050" y="990600"/>
+            <a:ext cx="9029850" cy="5031642"/>
+          </a:xfrm>
+          <a:prstGeom prst="rect">
+            <a:avLst/>
+          </a:prstGeom>
+        </p:spPr>
+      </p:pic>
+    </p:spTree>
+    <p:extLst>
+      <p:ext uri="{BB962C8B-B14F-4D97-AF65-F5344CB8AC3E}">
+        <p14:creationId xmlns:p14="http://schemas.microsoft.com/office/powerpoint/2010/main" val="851349911"/>
       </p:ext>
     </p:extLst>
   </p:cSld>
@@ -3514,7 +3581,7 @@
           <p:cNvPr id="2" name="Title 1">
             <a:extLst>
               <a:ext uri="{FF2B5EF4-FFF2-40B4-BE49-F238E27FC236}">
-                <a16:creationId xmlns:a16="http://schemas.microsoft.com/office/drawing/2014/main" id="{594FFCE6-1ACD-4226-9D03-AFAD9FEBE673}"/>
+                <a16:creationId xmlns:a16="http://schemas.microsoft.com/office/drawing/2014/main" xmlns="" id="{594FFCE6-1ACD-4226-9D03-AFAD9FEBE673}"/>
               </a:ext>
             </a:extLst>
           </p:cNvPr>
@@ -3542,7 +3609,7 @@
           <p:cNvPr id="3" name="Content Placeholder 2">
             <a:extLst>
               <a:ext uri="{FF2B5EF4-FFF2-40B4-BE49-F238E27FC236}">
-                <a16:creationId xmlns:a16="http://schemas.microsoft.com/office/drawing/2014/main" id="{9BA1858E-9F63-4E0C-951E-684A414E44CB}"/>
+                <a16:creationId xmlns:a16="http://schemas.microsoft.com/office/drawing/2014/main" xmlns="" id="{9BA1858E-9F63-4E0C-951E-684A414E44CB}"/>
               </a:ext>
             </a:extLst>
           </p:cNvPr>
@@ -3609,7 +3676,7 @@
           <p:cNvPr id="2" name="Title 1">
             <a:extLst>
               <a:ext uri="{FF2B5EF4-FFF2-40B4-BE49-F238E27FC236}">
-                <a16:creationId xmlns:a16="http://schemas.microsoft.com/office/drawing/2014/main" id="{9568D1B8-7A8E-4A48-BDFB-4B3631FBAF26}"/>
+                <a16:creationId xmlns:a16="http://schemas.microsoft.com/office/drawing/2014/main" xmlns="" id="{9568D1B8-7A8E-4A48-BDFB-4B3631FBAF26}"/>
               </a:ext>
             </a:extLst>
           </p:cNvPr>
@@ -3637,7 +3704,7 @@
           <p:cNvPr id="3" name="Content Placeholder 2">
             <a:extLst>
               <a:ext uri="{FF2B5EF4-FFF2-40B4-BE49-F238E27FC236}">
-                <a16:creationId xmlns:a16="http://schemas.microsoft.com/office/drawing/2014/main" id="{22E2C05F-97DC-4ED2-89D7-BBA284BD407D}"/>
+                <a16:creationId xmlns:a16="http://schemas.microsoft.com/office/drawing/2014/main" xmlns="" id="{22E2C05F-97DC-4ED2-89D7-BBA284BD407D}"/>
               </a:ext>
             </a:extLst>
           </p:cNvPr>
@@ -3718,7 +3785,7 @@
           <p:cNvPr id="2" name="Title 1">
             <a:extLst>
               <a:ext uri="{FF2B5EF4-FFF2-40B4-BE49-F238E27FC236}">
-                <a16:creationId xmlns:a16="http://schemas.microsoft.com/office/drawing/2014/main" id="{67E9B64B-067D-44C8-A237-B432FB6D4511}"/>
+                <a16:creationId xmlns:a16="http://schemas.microsoft.com/office/drawing/2014/main" xmlns="" id="{67E9B64B-067D-44C8-A237-B432FB6D4511}"/>
               </a:ext>
             </a:extLst>
           </p:cNvPr>
@@ -3746,7 +3813,7 @@
           <p:cNvPr id="3" name="Content Placeholder 2">
             <a:extLst>
               <a:ext uri="{FF2B5EF4-FFF2-40B4-BE49-F238E27FC236}">
-                <a16:creationId xmlns:a16="http://schemas.microsoft.com/office/drawing/2014/main" id="{3A83046D-9C2C-4DA1-A13E-4CB7DCFAB933}"/>
+                <a16:creationId xmlns:a16="http://schemas.microsoft.com/office/drawing/2014/main" xmlns="" id="{3A83046D-9C2C-4DA1-A13E-4CB7DCFAB933}"/>
               </a:ext>
             </a:extLst>
           </p:cNvPr>
@@ -3810,7 +3877,7 @@
           <p:cNvPr id="2" name="Title 1">
             <a:extLst>
               <a:ext uri="{FF2B5EF4-FFF2-40B4-BE49-F238E27FC236}">
-                <a16:creationId xmlns:a16="http://schemas.microsoft.com/office/drawing/2014/main" id="{83288EFA-2132-4D60-B2FF-CB52D1725690}"/>
+                <a16:creationId xmlns:a16="http://schemas.microsoft.com/office/drawing/2014/main" xmlns="" id="{83288EFA-2132-4D60-B2FF-CB52D1725690}"/>
               </a:ext>
             </a:extLst>
           </p:cNvPr>
@@ -3837,6 +3904,10 @@
               <a:rPr lang="en-US" b="1" dirty="0"/>
               <a:t>What have we found most difficult or surprising in the work so far?</a:t>
             </a:r>
+            <a:r>
+              <a:rPr lang="en-US" dirty="0"/>
+              <a:t/>
+            </a:r>
             <a:br>
               <a:rPr lang="en-US" dirty="0"/>
             </a:br>
@@ -3849,7 +3920,7 @@
           <p:cNvPr id="3" name="Content Placeholder 2">
             <a:extLst>
               <a:ext uri="{FF2B5EF4-FFF2-40B4-BE49-F238E27FC236}">
-                <a16:creationId xmlns:a16="http://schemas.microsoft.com/office/drawing/2014/main" id="{69F9ACA7-6CF0-4B3D-911B-277630BC9598}"/>
+                <a16:creationId xmlns:a16="http://schemas.microsoft.com/office/drawing/2014/main" xmlns="" id="{69F9ACA7-6CF0-4B3D-911B-277630BC9598}"/>
               </a:ext>
             </a:extLst>
           </p:cNvPr>
@@ -3872,14 +3943,65 @@
           <a:p>
             <a:r>
               <a:rPr lang="en-US" dirty="0"/>
-              <a:t>The inclusion of free right/left at certain signals is certainly one of the challenging things to accommodate for in this simulation.</a:t>
-            </a:r>
-          </a:p>
-          <a:p>
+              <a:t>The inclusion of free right/left at certain signals is certainly one of the challenging things to accommodate for in this simulation</a:t>
+            </a:r>
+            <a:r>
+              <a:rPr lang="en-US" dirty="0" smtClean="0"/>
+              <a:t>.</a:t>
+            </a:r>
+          </a:p>
+          <a:p>
+            <a:r>
+              <a:rPr lang="en-US" dirty="0" smtClean="0"/>
+              <a:t>We </a:t>
+            </a:r>
             <a:r>
               <a:rPr lang="en-US" dirty="0"/>
-              <a:t>We also faced difficulty in deciding the time granularity of the simulation.</a:t>
-            </a:r>
+              <a:t>also faced difficulty in deciding the time granularity of the simulation</a:t>
+            </a:r>
+            <a:r>
+              <a:rPr lang="en-US" dirty="0" smtClean="0"/>
+              <a:t>.</a:t>
+            </a:r>
+          </a:p>
+          <a:p>
+            <a:r>
+              <a:rPr lang="en-US" dirty="0" smtClean="0"/>
+              <a:t>Situations we still need to account for:</a:t>
+            </a:r>
+          </a:p>
+          <a:p>
+            <a:pPr lvl="1"/>
+            <a:r>
+              <a:rPr lang="en-US" dirty="0"/>
+              <a:t>L</a:t>
+            </a:r>
+            <a:r>
+              <a:rPr lang="en-US" dirty="0" smtClean="0"/>
+              <a:t>eft </a:t>
+            </a:r>
+            <a:r>
+              <a:rPr lang="en-US" dirty="0"/>
+              <a:t>turns, especially to avoid a deadlock when two cars want to turn left at the same time</a:t>
+            </a:r>
+          </a:p>
+          <a:p>
+            <a:pPr lvl="1"/>
+            <a:r>
+              <a:rPr lang="en-US" dirty="0"/>
+              <a:t>R</a:t>
+            </a:r>
+            <a:r>
+              <a:rPr lang="en-US" dirty="0" smtClean="0"/>
+              <a:t>ight-on-red </a:t>
+            </a:r>
+            <a:r>
+              <a:rPr lang="en-US" dirty="0"/>
+              <a:t>scenarios where conditions only apply to the first car in the queue</a:t>
+            </a:r>
+          </a:p>
+          <a:p>
+            <a:endParaRPr lang="en-US" dirty="0"/>
           </a:p>
         </p:txBody>
       </p:sp>
@@ -3918,7 +4040,7 @@
           <p:cNvPr id="2" name="Title 1">
             <a:extLst>
               <a:ext uri="{FF2B5EF4-FFF2-40B4-BE49-F238E27FC236}">
-                <a16:creationId xmlns:a16="http://schemas.microsoft.com/office/drawing/2014/main" id="{02EC65CD-6016-4C16-B81F-2BAFF8EC6B23}"/>
+                <a16:creationId xmlns:a16="http://schemas.microsoft.com/office/drawing/2014/main" xmlns="" id="{02EC65CD-6016-4C16-B81F-2BAFF8EC6B23}"/>
               </a:ext>
             </a:extLst>
           </p:cNvPr>
@@ -3946,7 +4068,7 @@
           <p:cNvPr id="3" name="Content Placeholder 2">
             <a:extLst>
               <a:ext uri="{FF2B5EF4-FFF2-40B4-BE49-F238E27FC236}">
-                <a16:creationId xmlns:a16="http://schemas.microsoft.com/office/drawing/2014/main" id="{A7C715E8-613B-4965-A1AD-A38C9EF14D23}"/>
+                <a16:creationId xmlns:a16="http://schemas.microsoft.com/office/drawing/2014/main" xmlns="" id="{A7C715E8-613B-4965-A1AD-A38C9EF14D23}"/>
               </a:ext>
             </a:extLst>
           </p:cNvPr>
@@ -3962,7 +4084,22 @@
           <a:bodyPr/>
           <a:lstStyle/>
           <a:p>
-            <a:endParaRPr lang="en-US" dirty="0"/>
+            <a:r>
+              <a:rPr lang="en-US" dirty="0" smtClean="0"/>
+              <a:t>Cars arrive at random time intervals in 4 separate queues (North, South, East, West)</a:t>
+            </a:r>
+          </a:p>
+          <a:p>
+            <a:r>
+              <a:rPr lang="en-US" dirty="0" smtClean="0"/>
+              <a:t>4-way stoplight is synced to switch between green and red for an amount of time set by the user</a:t>
+            </a:r>
+          </a:p>
+          <a:p>
+            <a:r>
+              <a:rPr lang="en-US" dirty="0" smtClean="0"/>
+              <a:t>Summary stats collected on the average amount of wait-time for all cars in the simulation</a:t>
+            </a:r>
           </a:p>
         </p:txBody>
       </p:sp>
@@ -4001,7 +4138,7 @@
           <p:cNvPr id="2" name="Title 1">
             <a:extLst>
               <a:ext uri="{FF2B5EF4-FFF2-40B4-BE49-F238E27FC236}">
-                <a16:creationId xmlns:a16="http://schemas.microsoft.com/office/drawing/2014/main" id="{BDFF5963-8F6A-41E4-8808-E41E97EE93B1}"/>
+                <a16:creationId xmlns:a16="http://schemas.microsoft.com/office/drawing/2014/main" xmlns="" id="{BDFF5963-8F6A-41E4-8808-E41E97EE93B1}"/>
               </a:ext>
             </a:extLst>
           </p:cNvPr>
@@ -4035,7 +4172,7 @@
           <p:cNvPr id="3" name="Content Placeholder 2">
             <a:extLst>
               <a:ext uri="{FF2B5EF4-FFF2-40B4-BE49-F238E27FC236}">
-                <a16:creationId xmlns:a16="http://schemas.microsoft.com/office/drawing/2014/main" id="{D35D1B74-BB6D-4FD2-8E65-37A662BD2C75}"/>
+                <a16:creationId xmlns:a16="http://schemas.microsoft.com/office/drawing/2014/main" xmlns="" id="{D35D1B74-BB6D-4FD2-8E65-37A662BD2C75}"/>
               </a:ext>
             </a:extLst>
           </p:cNvPr>
@@ -4051,7 +4188,23 @@
           <a:bodyPr/>
           <a:lstStyle/>
           <a:p>
+            <a:r>
+              <a:rPr lang="en-US" dirty="0" smtClean="0"/>
+              <a:t>Object oriented approach?</a:t>
+            </a:r>
+          </a:p>
+          <a:p>
+            <a:r>
+              <a:rPr lang="en-US" dirty="0" smtClean="0"/>
+              <a:t>How to avoid many global variables?</a:t>
+            </a:r>
             <a:endParaRPr lang="en-US" dirty="0"/>
+          </a:p>
+          <a:p>
+            <a:r>
+              <a:rPr lang="en-US" dirty="0" smtClean="0"/>
+              <a:t>Best way to check conditions for right-on-red and left turns? </a:t>
+            </a:r>
           </a:p>
         </p:txBody>
       </p:sp>
@@ -4090,7 +4243,7 @@
           <p:cNvPr id="2" name="Title 1">
             <a:extLst>
               <a:ext uri="{FF2B5EF4-FFF2-40B4-BE49-F238E27FC236}">
-                <a16:creationId xmlns:a16="http://schemas.microsoft.com/office/drawing/2014/main" id="{C97610AC-92EF-4DB3-B594-8E45D13B40DD}"/>
+                <a16:creationId xmlns:a16="http://schemas.microsoft.com/office/drawing/2014/main" xmlns="" id="{C97610AC-92EF-4DB3-B594-8E45D13B40DD}"/>
               </a:ext>
             </a:extLst>
           </p:cNvPr>
@@ -4118,7 +4271,7 @@
           <p:cNvPr id="3" name="Content Placeholder 2">
             <a:extLst>
               <a:ext uri="{FF2B5EF4-FFF2-40B4-BE49-F238E27FC236}">
-                <a16:creationId xmlns:a16="http://schemas.microsoft.com/office/drawing/2014/main" id="{699AD397-51EB-4440-9DB6-34C0CFE8A2BC}"/>
+                <a16:creationId xmlns:a16="http://schemas.microsoft.com/office/drawing/2014/main" xmlns="" id="{699AD397-51EB-4440-9DB6-34C0CFE8A2BC}"/>
               </a:ext>
             </a:extLst>
           </p:cNvPr>
@@ -4135,8 +4288,24 @@
           <a:lstStyle/>
           <a:p>
             <a:r>
+              <a:rPr lang="en-US" dirty="0" smtClean="0"/>
+              <a:t>Including green arrows in our stoplight, or designated turn lanes, and how much those improve average wait time for the intersection.</a:t>
+            </a:r>
+          </a:p>
+          <a:p>
+            <a:r>
+              <a:rPr lang="en-US" dirty="0" smtClean="0"/>
+              <a:t>Doing a cost-benefit analysis on adding sensors to change the stoplight depending on whether there are cars waiting.</a:t>
+            </a:r>
+          </a:p>
+          <a:p>
+            <a:r>
+              <a:rPr lang="en-US" dirty="0" smtClean="0"/>
+              <a:t>We </a:t>
+            </a:r>
+            <a:r>
               <a:rPr lang="en-US" dirty="0"/>
-              <a:t>We can extend out simulation to a network of stoplights at different intersection.</a:t>
+              <a:t>can extend out simulation to a network of stoplights at different intersection.</a:t>
             </a:r>
           </a:p>
           <a:p>
@@ -4151,6 +4320,66 @@
     <p:extLst>
       <p:ext uri="{BB962C8B-B14F-4D97-AF65-F5344CB8AC3E}">
         <p14:creationId xmlns:p14="http://schemas.microsoft.com/office/powerpoint/2010/main" val="2981342963"/>
+      </p:ext>
+    </p:extLst>
+  </p:cSld>
+  <p:clrMapOvr>
+    <a:masterClrMapping/>
+  </p:clrMapOvr>
+</p:sld>
+</file>
+
+<file path=ppt/slides/slide9.xml><?xml version="1.0" encoding="utf-8"?>
+<p:sld xmlns:a="http://schemas.openxmlformats.org/drawingml/2006/main" xmlns:r="http://schemas.openxmlformats.org/officeDocument/2006/relationships" xmlns:p="http://schemas.openxmlformats.org/presentationml/2006/main">
+  <p:cSld>
+    <p:spTree>
+      <p:nvGrpSpPr>
+        <p:cNvPr id="1" name=""/>
+        <p:cNvGrpSpPr/>
+        <p:nvPr/>
+      </p:nvGrpSpPr>
+      <p:grpSpPr>
+        <a:xfrm>
+          <a:off x="0" y="0"/>
+          <a:ext cx="0" cy="0"/>
+          <a:chOff x="0" y="0"/>
+          <a:chExt cx="0" cy="0"/>
+        </a:xfrm>
+      </p:grpSpPr>
+      <p:pic>
+        <p:nvPicPr>
+          <p:cNvPr id="2" name="Picture 1"/>
+          <p:cNvPicPr>
+            <a:picLocks noChangeAspect="1"/>
+          </p:cNvPicPr>
+          <p:nvPr/>
+        </p:nvPicPr>
+        <p:blipFill>
+          <a:blip r:embed="rId2">
+            <a:extLst>
+              <a:ext uri="{28A0092B-C50C-407E-A947-70E740481C1C}">
+                <a14:useLocalDpi xmlns:a14="http://schemas.microsoft.com/office/drawing/2010/main" val="0"/>
+              </a:ext>
+            </a:extLst>
+          </a:blip>
+          <a:stretch>
+            <a:fillRect/>
+          </a:stretch>
+        </p:blipFill>
+        <p:spPr>
+          <a:xfrm>
+            <a:off x="2197100" y="0"/>
+            <a:ext cx="7782393" cy="6858000"/>
+          </a:xfrm>
+          <a:prstGeom prst="rect">
+            <a:avLst/>
+          </a:prstGeom>
+        </p:spPr>
+      </p:pic>
+    </p:spTree>
+    <p:extLst>
+      <p:ext uri="{BB962C8B-B14F-4D97-AF65-F5344CB8AC3E}">
+        <p14:creationId xmlns:p14="http://schemas.microsoft.com/office/powerpoint/2010/main" val="401769497"/>
       </p:ext>
     </p:extLst>
   </p:cSld>

</xml_diff>